<commit_message>
Updated PPT and Wrote Speech
</commit_message>
<xml_diff>
--- a/Documentation/MastersDefense.pptx
+++ b/Documentation/MastersDefense.pptx
@@ -1445,14 +1445,6 @@
           <a:bodyPr/>
           <a:lstStyle/>
           <a:p>
-            <a:r>
-              <a:rPr lang="en-US" dirty="0" smtClean="0"/>
-              <a:t>Add review of what happened</a:t>
-            </a:r>
-            <a:r>
-              <a:rPr lang="en-US" baseline="0" dirty="0" smtClean="0"/>
-              <a:t> over every iteration?</a:t>
-            </a:r>
             <a:endParaRPr lang="en-US" dirty="0"/>
           </a:p>
         </p:txBody>
@@ -8035,8 +8027,12 @@
           </a:p>
           <a:p>
             <a:r>
+              <a:rPr lang="en-US" smtClean="0"/>
+              <a:t>Ported relevant </a:t>
+            </a:r>
+            <a:r>
               <a:rPr lang="en-US" dirty="0" smtClean="0"/>
-              <a:t>Ported code from Iteration 0 into project</a:t>
+              <a:t>code from Iteration 0 into project</a:t>
             </a:r>
           </a:p>
           <a:p>

</xml_diff>